<commit_message>
adding more comments to code, making it closer to my own personal standards
</commit_message>
<xml_diff>
--- a/final/slides.pptx
+++ b/final/slides.pptx
@@ -111,6 +111,1188 @@
     </a:lvl9pPr>
   </p:defaultTextStyle>
 </p:presentation>
+</file>
+
+<file path=ppt/charts/chart1.xml><?xml version="1.0" encoding="utf-8"?>
+<c:chartSpace xmlns:c="http://schemas.openxmlformats.org/drawingml/2006/chart" xmlns:a="http://schemas.openxmlformats.org/drawingml/2006/main" xmlns:r="http://schemas.openxmlformats.org/officeDocument/2006/relationships">
+  <c:date1904 val="0"/>
+  <c:lang val="en-US"/>
+  <c:roundedCorners val="0"/>
+  <mc:AlternateContent xmlns:mc="http://schemas.openxmlformats.org/markup-compatibility/2006">
+    <mc:Choice xmlns:c14="http://schemas.microsoft.com/office/drawing/2007/8/2/chart" Requires="c14">
+      <c14:style val="102"/>
+    </mc:Choice>
+    <mc:Fallback>
+      <c:style val="2"/>
+    </mc:Fallback>
+  </mc:AlternateContent>
+  <c:chart>
+    <c:autoTitleDeleted val="0"/>
+    <c:plotArea>
+      <c:layout>
+        <c:manualLayout>
+          <c:layoutTarget val="inner"/>
+          <c:xMode val="edge"/>
+          <c:yMode val="edge"/>
+          <c:x val="0.14647375328083986"/>
+          <c:y val="5.6030183727034118E-2"/>
+          <c:w val="0.72406802274715665"/>
+          <c:h val="0.8326195683872849"/>
+        </c:manualLayout>
+      </c:layout>
+      <c:scatterChart>
+        <c:scatterStyle val="lineMarker"/>
+        <c:varyColors val="0"/>
+        <c:ser>
+          <c:idx val="0"/>
+          <c:order val="0"/>
+          <c:spPr>
+            <a:ln w="28575">
+              <a:noFill/>
+            </a:ln>
+          </c:spPr>
+          <c:xVal>
+            <c:numRef>
+              <c:f>[out.csv]out!$A$164:$A$243</c:f>
+              <c:numCache>
+                <c:formatCode>General</c:formatCode>
+                <c:ptCount val="80"/>
+                <c:pt idx="0">
+                  <c:v>1</c:v>
+                </c:pt>
+                <c:pt idx="1">
+                  <c:v>2</c:v>
+                </c:pt>
+                <c:pt idx="2">
+                  <c:v>3</c:v>
+                </c:pt>
+                <c:pt idx="3">
+                  <c:v>4</c:v>
+                </c:pt>
+                <c:pt idx="4">
+                  <c:v>5</c:v>
+                </c:pt>
+                <c:pt idx="5">
+                  <c:v>6</c:v>
+                </c:pt>
+                <c:pt idx="6">
+                  <c:v>7</c:v>
+                </c:pt>
+                <c:pt idx="7">
+                  <c:v>8</c:v>
+                </c:pt>
+                <c:pt idx="8">
+                  <c:v>9</c:v>
+                </c:pt>
+                <c:pt idx="9">
+                  <c:v>10</c:v>
+                </c:pt>
+                <c:pt idx="10">
+                  <c:v>11</c:v>
+                </c:pt>
+                <c:pt idx="11">
+                  <c:v>12</c:v>
+                </c:pt>
+                <c:pt idx="12">
+                  <c:v>13</c:v>
+                </c:pt>
+                <c:pt idx="13">
+                  <c:v>14</c:v>
+                </c:pt>
+                <c:pt idx="14">
+                  <c:v>15</c:v>
+                </c:pt>
+                <c:pt idx="15">
+                  <c:v>16</c:v>
+                </c:pt>
+                <c:pt idx="16">
+                  <c:v>17</c:v>
+                </c:pt>
+                <c:pt idx="17">
+                  <c:v>18</c:v>
+                </c:pt>
+                <c:pt idx="18">
+                  <c:v>19</c:v>
+                </c:pt>
+                <c:pt idx="19">
+                  <c:v>20</c:v>
+                </c:pt>
+                <c:pt idx="20">
+                  <c:v>21</c:v>
+                </c:pt>
+                <c:pt idx="21">
+                  <c:v>22</c:v>
+                </c:pt>
+                <c:pt idx="22">
+                  <c:v>23</c:v>
+                </c:pt>
+                <c:pt idx="23">
+                  <c:v>24</c:v>
+                </c:pt>
+                <c:pt idx="24">
+                  <c:v>25</c:v>
+                </c:pt>
+                <c:pt idx="25">
+                  <c:v>26</c:v>
+                </c:pt>
+                <c:pt idx="26">
+                  <c:v>27</c:v>
+                </c:pt>
+                <c:pt idx="27">
+                  <c:v>28</c:v>
+                </c:pt>
+                <c:pt idx="28">
+                  <c:v>29</c:v>
+                </c:pt>
+                <c:pt idx="29">
+                  <c:v>30</c:v>
+                </c:pt>
+                <c:pt idx="30">
+                  <c:v>31</c:v>
+                </c:pt>
+                <c:pt idx="31">
+                  <c:v>32</c:v>
+                </c:pt>
+                <c:pt idx="32">
+                  <c:v>33</c:v>
+                </c:pt>
+                <c:pt idx="33">
+                  <c:v>34</c:v>
+                </c:pt>
+                <c:pt idx="34">
+                  <c:v>35</c:v>
+                </c:pt>
+                <c:pt idx="35">
+                  <c:v>36</c:v>
+                </c:pt>
+                <c:pt idx="36">
+                  <c:v>37</c:v>
+                </c:pt>
+                <c:pt idx="37">
+                  <c:v>38</c:v>
+                </c:pt>
+                <c:pt idx="38">
+                  <c:v>39</c:v>
+                </c:pt>
+                <c:pt idx="39">
+                  <c:v>40</c:v>
+                </c:pt>
+                <c:pt idx="40">
+                  <c:v>41</c:v>
+                </c:pt>
+                <c:pt idx="41">
+                  <c:v>42</c:v>
+                </c:pt>
+                <c:pt idx="42">
+                  <c:v>43</c:v>
+                </c:pt>
+                <c:pt idx="43">
+                  <c:v>44</c:v>
+                </c:pt>
+                <c:pt idx="44">
+                  <c:v>45</c:v>
+                </c:pt>
+                <c:pt idx="45">
+                  <c:v>46</c:v>
+                </c:pt>
+                <c:pt idx="46">
+                  <c:v>47</c:v>
+                </c:pt>
+                <c:pt idx="47">
+                  <c:v>48</c:v>
+                </c:pt>
+                <c:pt idx="48">
+                  <c:v>49</c:v>
+                </c:pt>
+                <c:pt idx="49">
+                  <c:v>50</c:v>
+                </c:pt>
+                <c:pt idx="50">
+                  <c:v>51</c:v>
+                </c:pt>
+                <c:pt idx="51">
+                  <c:v>52</c:v>
+                </c:pt>
+                <c:pt idx="52">
+                  <c:v>53</c:v>
+                </c:pt>
+                <c:pt idx="53">
+                  <c:v>54</c:v>
+                </c:pt>
+                <c:pt idx="54">
+                  <c:v>55</c:v>
+                </c:pt>
+                <c:pt idx="55">
+                  <c:v>56</c:v>
+                </c:pt>
+                <c:pt idx="56">
+                  <c:v>57</c:v>
+                </c:pt>
+                <c:pt idx="57">
+                  <c:v>58</c:v>
+                </c:pt>
+                <c:pt idx="58">
+                  <c:v>59</c:v>
+                </c:pt>
+                <c:pt idx="59">
+                  <c:v>60</c:v>
+                </c:pt>
+                <c:pt idx="60">
+                  <c:v>61</c:v>
+                </c:pt>
+                <c:pt idx="61">
+                  <c:v>62</c:v>
+                </c:pt>
+                <c:pt idx="62">
+                  <c:v>63</c:v>
+                </c:pt>
+                <c:pt idx="63">
+                  <c:v>64</c:v>
+                </c:pt>
+                <c:pt idx="64">
+                  <c:v>65</c:v>
+                </c:pt>
+                <c:pt idx="65">
+                  <c:v>66</c:v>
+                </c:pt>
+                <c:pt idx="66">
+                  <c:v>67</c:v>
+                </c:pt>
+                <c:pt idx="67">
+                  <c:v>68</c:v>
+                </c:pt>
+                <c:pt idx="68">
+                  <c:v>69</c:v>
+                </c:pt>
+                <c:pt idx="69">
+                  <c:v>70</c:v>
+                </c:pt>
+                <c:pt idx="70">
+                  <c:v>71</c:v>
+                </c:pt>
+                <c:pt idx="71">
+                  <c:v>72</c:v>
+                </c:pt>
+                <c:pt idx="72">
+                  <c:v>73</c:v>
+                </c:pt>
+                <c:pt idx="73">
+                  <c:v>74</c:v>
+                </c:pt>
+                <c:pt idx="74">
+                  <c:v>75</c:v>
+                </c:pt>
+                <c:pt idx="75">
+                  <c:v>76</c:v>
+                </c:pt>
+                <c:pt idx="76">
+                  <c:v>77</c:v>
+                </c:pt>
+                <c:pt idx="77">
+                  <c:v>78</c:v>
+                </c:pt>
+                <c:pt idx="78">
+                  <c:v>79</c:v>
+                </c:pt>
+                <c:pt idx="79">
+                  <c:v>80</c:v>
+                </c:pt>
+              </c:numCache>
+            </c:numRef>
+          </c:xVal>
+          <c:yVal>
+            <c:numRef>
+              <c:f>[out.csv]out!$C$164:$C$243</c:f>
+              <c:numCache>
+                <c:formatCode>General</c:formatCode>
+                <c:ptCount val="80"/>
+                <c:pt idx="0">
+                  <c:v>1</c:v>
+                </c:pt>
+                <c:pt idx="1">
+                  <c:v>0.12513051805628495</c:v>
+                </c:pt>
+                <c:pt idx="2">
+                  <c:v>0.1297679016564505</c:v>
+                </c:pt>
+                <c:pt idx="3">
+                  <c:v>0.12726301615798924</c:v>
+                </c:pt>
+                <c:pt idx="4">
+                  <c:v>9.0945656232078176E-2</c:v>
+                </c:pt>
+                <c:pt idx="5">
+                  <c:v>9.137633955810695E-2</c:v>
+                </c:pt>
+                <c:pt idx="6">
+                  <c:v>9.176982017721505E-2</c:v>
+                </c:pt>
+                <c:pt idx="7">
+                  <c:v>8.6228058437845909E-2</c:v>
+                </c:pt>
+                <c:pt idx="8">
+                  <c:v>8.6630025935934177E-2</c:v>
+                </c:pt>
+                <c:pt idx="9">
+                  <c:v>8.6987814306225403E-2</c:v>
+                </c:pt>
+                <c:pt idx="10">
+                  <c:v>8.693442461196782E-2</c:v>
+                </c:pt>
+                <c:pt idx="11">
+                  <c:v>8.3970065478064904E-2</c:v>
+                </c:pt>
+                <c:pt idx="12">
+                  <c:v>8.3880949704372279E-2</c:v>
+                </c:pt>
+                <c:pt idx="13">
+                  <c:v>8.3915865718988403E-2</c:v>
+                </c:pt>
+                <c:pt idx="14">
+                  <c:v>8.3310154243458001E-2</c:v>
+                </c:pt>
+                <c:pt idx="15">
+                  <c:v>8.2106122732642978E-2</c:v>
+                </c:pt>
+                <c:pt idx="16">
+                  <c:v>8.1924181007010821E-2</c:v>
+                </c:pt>
+                <c:pt idx="17">
+                  <c:v>3.7492705322044233E-2</c:v>
+                </c:pt>
+                <c:pt idx="18">
+                  <c:v>8.0607387280088802E-2</c:v>
+                </c:pt>
+                <c:pt idx="19">
+                  <c:v>8.2146442369117528E-2</c:v>
+                </c:pt>
+                <c:pt idx="20">
+                  <c:v>8.164427100758527E-2</c:v>
+                </c:pt>
+                <c:pt idx="21">
+                  <c:v>8.1195205910062518E-2</c:v>
+                </c:pt>
+                <c:pt idx="22">
+                  <c:v>8.2743193174358326E-2</c:v>
+                </c:pt>
+                <c:pt idx="23">
+                  <c:v>8.2297884856142728E-2</c:v>
+                </c:pt>
+                <c:pt idx="24">
+                  <c:v>8.1507997121684703E-2</c:v>
+                </c:pt>
+                <c:pt idx="25">
+                  <c:v>8.1918486567069321E-2</c:v>
+                </c:pt>
+                <c:pt idx="26">
+                  <c:v>8.2175588947842437E-2</c:v>
+                </c:pt>
+                <c:pt idx="27">
+                  <c:v>8.2021602227913146E-2</c:v>
+                </c:pt>
+                <c:pt idx="28">
+                  <c:v>8.2522760021846275E-2</c:v>
+                </c:pt>
+                <c:pt idx="29">
+                  <c:v>8.1875687129315922E-2</c:v>
+                </c:pt>
+                <c:pt idx="30">
+                  <c:v>8.2028579811593186E-2</c:v>
+                </c:pt>
+                <c:pt idx="31">
+                  <c:v>8.0150454180465514E-2</c:v>
+                </c:pt>
+                <c:pt idx="32">
+                  <c:v>7.6490291328803875E-2</c:v>
+                </c:pt>
+                <c:pt idx="33">
+                  <c:v>7.6848441831500858E-2</c:v>
+                </c:pt>
+                <c:pt idx="34">
+                  <c:v>7.6814183266315506E-2</c:v>
+                </c:pt>
+                <c:pt idx="35">
+                  <c:v>7.9711662386228982E-2</c:v>
+                </c:pt>
+                <c:pt idx="36">
+                  <c:v>7.9630632959701533E-2</c:v>
+                </c:pt>
+                <c:pt idx="37">
+                  <c:v>7.8485933190851412E-2</c:v>
+                </c:pt>
+                <c:pt idx="38">
+                  <c:v>7.8691438481184525E-2</c:v>
+                </c:pt>
+                <c:pt idx="39">
+                  <c:v>7.9982104715621796E-2</c:v>
+                </c:pt>
+                <c:pt idx="40">
+                  <c:v>7.9555583963104984E-2</c:v>
+                </c:pt>
+                <c:pt idx="41">
+                  <c:v>7.9893148092589614E-2</c:v>
+                </c:pt>
+                <c:pt idx="42">
+                  <c:v>7.9330220411715585E-2</c:v>
+                </c:pt>
+                <c:pt idx="43">
+                  <c:v>7.8938490879633255E-2</c:v>
+                </c:pt>
+                <c:pt idx="44">
+                  <c:v>7.923785683891417E-2</c:v>
+                </c:pt>
+                <c:pt idx="45">
+                  <c:v>7.9911161704690509E-2</c:v>
+                </c:pt>
+                <c:pt idx="46">
+                  <c:v>7.9623939341215672E-2</c:v>
+                </c:pt>
+                <c:pt idx="47">
+                  <c:v>7.9410405563226275E-2</c:v>
+                </c:pt>
+                <c:pt idx="48">
+                  <c:v>7.9660365648926396E-2</c:v>
+                </c:pt>
+                <c:pt idx="49">
+                  <c:v>7.990143398870421E-2</c:v>
+                </c:pt>
+                <c:pt idx="50">
+                  <c:v>7.9456975792963014E-2</c:v>
+                </c:pt>
+                <c:pt idx="51">
+                  <c:v>7.9222886058450542E-2</c:v>
+                </c:pt>
+                <c:pt idx="52">
+                  <c:v>8.0202092892240118E-2</c:v>
+                </c:pt>
+                <c:pt idx="53">
+                  <c:v>7.9479327379227624E-2</c:v>
+                </c:pt>
+                <c:pt idx="54">
+                  <c:v>7.9889021808354999E-2</c:v>
+                </c:pt>
+                <c:pt idx="55">
+                  <c:v>8.084658623463363E-2</c:v>
+                </c:pt>
+                <c:pt idx="56">
+                  <c:v>8.0142738515468298E-2</c:v>
+                </c:pt>
+                <c:pt idx="57">
+                  <c:v>8.0484308398492313E-2</c:v>
+                </c:pt>
+                <c:pt idx="58">
+                  <c:v>7.981157973129574E-2</c:v>
+                </c:pt>
+                <c:pt idx="59">
+                  <c:v>8.0355746100985559E-2</c:v>
+                </c:pt>
+                <c:pt idx="60">
+                  <c:v>7.7430032305076099E-2</c:v>
+                </c:pt>
+                <c:pt idx="61">
+                  <c:v>8.1303561314949563E-2</c:v>
+                </c:pt>
+                <c:pt idx="62">
+                  <c:v>8.066274676827842E-2</c:v>
+                </c:pt>
+                <c:pt idx="63">
+                  <c:v>3.3275072685839062E-2</c:v>
+                </c:pt>
+                <c:pt idx="64">
+                  <c:v>7.8459183045331143E-2</c:v>
+                </c:pt>
+                <c:pt idx="65">
+                  <c:v>7.3083183297621812E-2</c:v>
+                </c:pt>
+                <c:pt idx="66">
+                  <c:v>7.5205464647444362E-2</c:v>
+                </c:pt>
+                <c:pt idx="67">
+                  <c:v>6.8596612616263972E-2</c:v>
+                </c:pt>
+                <c:pt idx="68">
+                  <c:v>6.2803568212744548E-2</c:v>
+                </c:pt>
+                <c:pt idx="69">
+                  <c:v>6.3329709285507407E-2</c:v>
+                </c:pt>
+                <c:pt idx="70">
+                  <c:v>6.5478668145493135E-2</c:v>
+                </c:pt>
+                <c:pt idx="71">
+                  <c:v>6.5549068404827493E-2</c:v>
+                </c:pt>
+                <c:pt idx="72">
+                  <c:v>4.2505692358298257E-2</c:v>
+                </c:pt>
+                <c:pt idx="73">
+                  <c:v>7.4781398652302294E-2</c:v>
+                </c:pt>
+                <c:pt idx="74">
+                  <c:v>7.6380792496988328E-2</c:v>
+                </c:pt>
+                <c:pt idx="75">
+                  <c:v>7.5881107769087144E-2</c:v>
+                </c:pt>
+                <c:pt idx="76">
+                  <c:v>6.8332782482958057E-2</c:v>
+                </c:pt>
+                <c:pt idx="77">
+                  <c:v>7.2594919561329421E-2</c:v>
+                </c:pt>
+                <c:pt idx="78">
+                  <c:v>7.5764509004448297E-2</c:v>
+                </c:pt>
+                <c:pt idx="79">
+                  <c:v>6.8831419862569965E-2</c:v>
+                </c:pt>
+              </c:numCache>
+            </c:numRef>
+          </c:yVal>
+          <c:smooth val="0"/>
+        </c:ser>
+        <c:dLbls>
+          <c:showLegendKey val="0"/>
+          <c:showVal val="0"/>
+          <c:showCatName val="0"/>
+          <c:showSerName val="0"/>
+          <c:showPercent val="0"/>
+          <c:showBubbleSize val="0"/>
+        </c:dLbls>
+        <c:axId val="39787136"/>
+        <c:axId val="39793024"/>
+      </c:scatterChart>
+      <c:valAx>
+        <c:axId val="39787136"/>
+        <c:scaling>
+          <c:orientation val="minMax"/>
+        </c:scaling>
+        <c:delete val="0"/>
+        <c:axPos val="b"/>
+        <c:numFmt formatCode="General" sourceLinked="1"/>
+        <c:majorTickMark val="out"/>
+        <c:minorTickMark val="none"/>
+        <c:tickLblPos val="nextTo"/>
+        <c:crossAx val="39793024"/>
+        <c:crosses val="autoZero"/>
+        <c:crossBetween val="midCat"/>
+      </c:valAx>
+      <c:valAx>
+        <c:axId val="39793024"/>
+        <c:scaling>
+          <c:orientation val="minMax"/>
+        </c:scaling>
+        <c:delete val="0"/>
+        <c:axPos val="l"/>
+        <c:majorGridlines/>
+        <c:numFmt formatCode="General" sourceLinked="1"/>
+        <c:majorTickMark val="out"/>
+        <c:minorTickMark val="none"/>
+        <c:tickLblPos val="nextTo"/>
+        <c:crossAx val="39787136"/>
+        <c:crosses val="autoZero"/>
+        <c:crossBetween val="midCat"/>
+      </c:valAx>
+    </c:plotArea>
+    <c:legend>
+      <c:legendPos val="r"/>
+      <c:layout/>
+      <c:overlay val="0"/>
+    </c:legend>
+    <c:plotVisOnly val="1"/>
+    <c:dispBlanksAs val="gap"/>
+    <c:showDLblsOverMax val="0"/>
+  </c:chart>
+  <c:externalData r:id="rId1">
+    <c:autoUpdate val="0"/>
+  </c:externalData>
+</c:chartSpace>
+</file>
+
+<file path=ppt/charts/chart2.xml><?xml version="1.0" encoding="utf-8"?>
+<c:chartSpace xmlns:c="http://schemas.openxmlformats.org/drawingml/2006/chart" xmlns:a="http://schemas.openxmlformats.org/drawingml/2006/main" xmlns:r="http://schemas.openxmlformats.org/officeDocument/2006/relationships">
+  <c:date1904 val="0"/>
+  <c:lang val="en-US"/>
+  <c:roundedCorners val="0"/>
+  <mc:AlternateContent xmlns:mc="http://schemas.openxmlformats.org/markup-compatibility/2006">
+    <mc:Choice xmlns:c14="http://schemas.microsoft.com/office/drawing/2007/8/2/chart" Requires="c14">
+      <c14:style val="102"/>
+    </mc:Choice>
+    <mc:Fallback>
+      <c:style val="2"/>
+    </mc:Fallback>
+  </mc:AlternateContent>
+  <c:chart>
+    <c:autoTitleDeleted val="0"/>
+    <c:plotArea>
+      <c:layout/>
+      <c:scatterChart>
+        <c:scatterStyle val="lineMarker"/>
+        <c:varyColors val="0"/>
+        <c:ser>
+          <c:idx val="0"/>
+          <c:order val="0"/>
+          <c:spPr>
+            <a:ln w="28575">
+              <a:noFill/>
+            </a:ln>
+          </c:spPr>
+          <c:xVal>
+            <c:numRef>
+              <c:f>[out.csv]out!$A$164:$A$243</c:f>
+              <c:numCache>
+                <c:formatCode>General</c:formatCode>
+                <c:ptCount val="80"/>
+                <c:pt idx="0">
+                  <c:v>1</c:v>
+                </c:pt>
+                <c:pt idx="1">
+                  <c:v>2</c:v>
+                </c:pt>
+                <c:pt idx="2">
+                  <c:v>3</c:v>
+                </c:pt>
+                <c:pt idx="3">
+                  <c:v>4</c:v>
+                </c:pt>
+                <c:pt idx="4">
+                  <c:v>5</c:v>
+                </c:pt>
+                <c:pt idx="5">
+                  <c:v>6</c:v>
+                </c:pt>
+                <c:pt idx="6">
+                  <c:v>7</c:v>
+                </c:pt>
+                <c:pt idx="7">
+                  <c:v>8</c:v>
+                </c:pt>
+                <c:pt idx="8">
+                  <c:v>9</c:v>
+                </c:pt>
+                <c:pt idx="9">
+                  <c:v>10</c:v>
+                </c:pt>
+                <c:pt idx="10">
+                  <c:v>11</c:v>
+                </c:pt>
+                <c:pt idx="11">
+                  <c:v>12</c:v>
+                </c:pt>
+                <c:pt idx="12">
+                  <c:v>13</c:v>
+                </c:pt>
+                <c:pt idx="13">
+                  <c:v>14</c:v>
+                </c:pt>
+                <c:pt idx="14">
+                  <c:v>15</c:v>
+                </c:pt>
+                <c:pt idx="15">
+                  <c:v>16</c:v>
+                </c:pt>
+                <c:pt idx="16">
+                  <c:v>17</c:v>
+                </c:pt>
+                <c:pt idx="17">
+                  <c:v>18</c:v>
+                </c:pt>
+                <c:pt idx="18">
+                  <c:v>19</c:v>
+                </c:pt>
+                <c:pt idx="19">
+                  <c:v>20</c:v>
+                </c:pt>
+                <c:pt idx="20">
+                  <c:v>21</c:v>
+                </c:pt>
+                <c:pt idx="21">
+                  <c:v>22</c:v>
+                </c:pt>
+                <c:pt idx="22">
+                  <c:v>23</c:v>
+                </c:pt>
+                <c:pt idx="23">
+                  <c:v>24</c:v>
+                </c:pt>
+                <c:pt idx="24">
+                  <c:v>25</c:v>
+                </c:pt>
+                <c:pt idx="25">
+                  <c:v>26</c:v>
+                </c:pt>
+                <c:pt idx="26">
+                  <c:v>27</c:v>
+                </c:pt>
+                <c:pt idx="27">
+                  <c:v>28</c:v>
+                </c:pt>
+                <c:pt idx="28">
+                  <c:v>29</c:v>
+                </c:pt>
+                <c:pt idx="29">
+                  <c:v>30</c:v>
+                </c:pt>
+                <c:pt idx="30">
+                  <c:v>31</c:v>
+                </c:pt>
+                <c:pt idx="31">
+                  <c:v>32</c:v>
+                </c:pt>
+                <c:pt idx="32">
+                  <c:v>33</c:v>
+                </c:pt>
+                <c:pt idx="33">
+                  <c:v>34</c:v>
+                </c:pt>
+                <c:pt idx="34">
+                  <c:v>35</c:v>
+                </c:pt>
+                <c:pt idx="35">
+                  <c:v>36</c:v>
+                </c:pt>
+                <c:pt idx="36">
+                  <c:v>37</c:v>
+                </c:pt>
+                <c:pt idx="37">
+                  <c:v>38</c:v>
+                </c:pt>
+                <c:pt idx="38">
+                  <c:v>39</c:v>
+                </c:pt>
+                <c:pt idx="39">
+                  <c:v>40</c:v>
+                </c:pt>
+                <c:pt idx="40">
+                  <c:v>41</c:v>
+                </c:pt>
+                <c:pt idx="41">
+                  <c:v>42</c:v>
+                </c:pt>
+                <c:pt idx="42">
+                  <c:v>43</c:v>
+                </c:pt>
+                <c:pt idx="43">
+                  <c:v>44</c:v>
+                </c:pt>
+                <c:pt idx="44">
+                  <c:v>45</c:v>
+                </c:pt>
+                <c:pt idx="45">
+                  <c:v>46</c:v>
+                </c:pt>
+                <c:pt idx="46">
+                  <c:v>47</c:v>
+                </c:pt>
+                <c:pt idx="47">
+                  <c:v>48</c:v>
+                </c:pt>
+                <c:pt idx="48">
+                  <c:v>49</c:v>
+                </c:pt>
+                <c:pt idx="49">
+                  <c:v>50</c:v>
+                </c:pt>
+                <c:pt idx="50">
+                  <c:v>51</c:v>
+                </c:pt>
+                <c:pt idx="51">
+                  <c:v>52</c:v>
+                </c:pt>
+                <c:pt idx="52">
+                  <c:v>53</c:v>
+                </c:pt>
+                <c:pt idx="53">
+                  <c:v>54</c:v>
+                </c:pt>
+                <c:pt idx="54">
+                  <c:v>55</c:v>
+                </c:pt>
+                <c:pt idx="55">
+                  <c:v>56</c:v>
+                </c:pt>
+                <c:pt idx="56">
+                  <c:v>57</c:v>
+                </c:pt>
+                <c:pt idx="57">
+                  <c:v>58</c:v>
+                </c:pt>
+                <c:pt idx="58">
+                  <c:v>59</c:v>
+                </c:pt>
+                <c:pt idx="59">
+                  <c:v>60</c:v>
+                </c:pt>
+                <c:pt idx="60">
+                  <c:v>61</c:v>
+                </c:pt>
+                <c:pt idx="61">
+                  <c:v>62</c:v>
+                </c:pt>
+                <c:pt idx="62">
+                  <c:v>63</c:v>
+                </c:pt>
+                <c:pt idx="63">
+                  <c:v>64</c:v>
+                </c:pt>
+                <c:pt idx="64">
+                  <c:v>65</c:v>
+                </c:pt>
+                <c:pt idx="65">
+                  <c:v>66</c:v>
+                </c:pt>
+                <c:pt idx="66">
+                  <c:v>67</c:v>
+                </c:pt>
+                <c:pt idx="67">
+                  <c:v>68</c:v>
+                </c:pt>
+                <c:pt idx="68">
+                  <c:v>69</c:v>
+                </c:pt>
+                <c:pt idx="69">
+                  <c:v>70</c:v>
+                </c:pt>
+                <c:pt idx="70">
+                  <c:v>71</c:v>
+                </c:pt>
+                <c:pt idx="71">
+                  <c:v>72</c:v>
+                </c:pt>
+                <c:pt idx="72">
+                  <c:v>73</c:v>
+                </c:pt>
+                <c:pt idx="73">
+                  <c:v>74</c:v>
+                </c:pt>
+                <c:pt idx="74">
+                  <c:v>75</c:v>
+                </c:pt>
+                <c:pt idx="75">
+                  <c:v>76</c:v>
+                </c:pt>
+                <c:pt idx="76">
+                  <c:v>77</c:v>
+                </c:pt>
+                <c:pt idx="77">
+                  <c:v>78</c:v>
+                </c:pt>
+                <c:pt idx="78">
+                  <c:v>79</c:v>
+                </c:pt>
+                <c:pt idx="79">
+                  <c:v>80</c:v>
+                </c:pt>
+              </c:numCache>
+            </c:numRef>
+          </c:xVal>
+          <c:yVal>
+            <c:numRef>
+              <c:f>[out.csv]out!$D$164:$D$243</c:f>
+              <c:numCache>
+                <c:formatCode>General</c:formatCode>
+                <c:ptCount val="80"/>
+                <c:pt idx="0">
+                  <c:v>7.9916555572014021</c:v>
+                </c:pt>
+                <c:pt idx="1">
+                  <c:v>1</c:v>
+                </c:pt>
+                <c:pt idx="2">
+                  <c:v>1.0370603724191376</c:v>
+                </c:pt>
+                <c:pt idx="3">
+                  <c:v>1.0170421903052065</c:v>
+                </c:pt>
+                <c:pt idx="4">
+                  <c:v>0.7268063590304159</c:v>
+                </c:pt>
+                <c:pt idx="5">
+                  <c:v>0.73024823182626764</c:v>
+                </c:pt>
+                <c:pt idx="6">
+                  <c:v>0.73339279340261398</c:v>
+                </c:pt>
+                <c:pt idx="7">
+                  <c:v>0.68910494240149844</c:v>
+                </c:pt>
+                <c:pt idx="8">
+                  <c:v>0.69231732819141001</c:v>
+                </c:pt>
+                <c:pt idx="9">
+                  <c:v>0.69517664960914982</c:v>
+                </c:pt>
+                <c:pt idx="10">
+                  <c:v>0.69474997756233903</c:v>
+                </c:pt>
+                <c:pt idx="11">
+                  <c:v>0.67105984041634303</c:v>
+                </c:pt>
+                <c:pt idx="12">
+                  <c:v>0.67034765784827799</c:v>
+                </c:pt>
+                <c:pt idx="13">
+                  <c:v>0.67062669461052027</c:v>
+                </c:pt>
+                <c:pt idx="14">
+                  <c:v>0.66578605713103711</c:v>
+                </c:pt>
+                <c:pt idx="15">
+                  <c:v>0.65616385201658667</c:v>
+                </c:pt>
+                <c:pt idx="16">
+                  <c:v>0.65470983641385161</c:v>
+                </c:pt>
+                <c:pt idx="17">
+                  <c:v>0.29962878684142935</c:v>
+                </c:pt>
+                <c:pt idx="18">
+                  <c:v>0.64418647450840727</c:v>
+                </c:pt>
+                <c:pt idx="19">
+                  <c:v>0.6564860726634828</c:v>
+                </c:pt>
+                <c:pt idx="20">
+                  <c:v>0.65247289211142612</c:v>
+                </c:pt>
+                <c:pt idx="21">
+                  <c:v>0.64888411852926331</c:v>
+                </c:pt>
+                <c:pt idx="22">
+                  <c:v>0.66125509955244977</c:v>
+                </c:pt>
+                <c:pt idx="23">
+                  <c:v>0.65769634885651418</c:v>
+                </c:pt>
+                <c:pt idx="24">
+                  <c:v>0.65138383815386747</c:v>
+                </c:pt>
+                <c:pt idx="25">
+                  <c:v>0.654664328411248</c:v>
+                </c:pt>
+                <c:pt idx="26">
+                  <c:v>0.65671900208132317</c:v>
+                </c:pt>
+                <c:pt idx="27">
+                  <c:v>0.65548839325526498</c:v>
+                </c:pt>
+                <c:pt idx="28">
+                  <c:v>0.65949347372418543</c:v>
+                </c:pt>
+                <c:pt idx="29">
+                  <c:v>0.65432229004668085</c:v>
+                </c:pt>
+                <c:pt idx="30">
+                  <c:v>0.65554415570065749</c:v>
+                </c:pt>
+                <c:pt idx="31">
+                  <c:v>0.64053482256353356</c:v>
+                </c:pt>
+                <c:pt idx="32">
+                  <c:v>0.61128406176978967</c:v>
+                </c:pt>
+                <c:pt idx="33">
+                  <c:v>0.6141462772249825</c:v>
+                </c:pt>
+                <c:pt idx="34">
+                  <c:v>0.61387249457213733</c:v>
+                </c:pt>
+                <c:pt idx="35">
+                  <c:v>0.63702814968266885</c:v>
+                </c:pt>
+                <c:pt idx="36">
+                  <c:v>0.63638059041586392</c:v>
+                </c:pt>
+                <c:pt idx="37">
+                  <c:v>0.62723254414680574</c:v>
+                </c:pt>
+                <c:pt idx="38">
+                  <c:v>0.62887487164233058</c:v>
+                </c:pt>
+                <c:pt idx="39">
+                  <c:v>0.63918943162726338</c:v>
+                </c:pt>
+                <c:pt idx="40">
+                  <c:v>0.63578082468515074</c:v>
+                </c:pt>
+                <c:pt idx="41">
+                  <c:v>0.63847852093645829</c:v>
+                </c:pt>
+                <c:pt idx="42">
+                  <c:v>0.63397979680729899</c:v>
+                </c:pt>
+                <c:pt idx="43">
+                  <c:v>0.63084922931531329</c:v>
+                </c:pt>
+                <c:pt idx="44">
+                  <c:v>0.63324165894743756</c:v>
+                </c:pt>
+                <c:pt idx="45">
+                  <c:v>0.63862247951970974</c:v>
+                </c:pt>
+                <c:pt idx="46">
+                  <c:v>0.6363270973224936</c:v>
+                </c:pt>
+                <c:pt idx="47">
+                  <c:v>0.63462060891897443</c:v>
+                </c:pt>
+                <c:pt idx="48">
+                  <c:v>0.63661820382693834</c:v>
+                </c:pt>
+                <c:pt idx="49">
+                  <c:v>0.63854473896418895</c:v>
+                </c:pt>
+                <c:pt idx="50">
+                  <c:v>0.63499278215425015</c:v>
+                </c:pt>
+                <c:pt idx="51">
+                  <c:v>0.63312201762654985</c:v>
+                </c:pt>
+                <c:pt idx="52">
+                  <c:v>0.64094750136145384</c:v>
+                </c:pt>
+                <c:pt idx="53">
+                  <c:v>0.63517140833283403</c:v>
+                </c:pt>
+                <c:pt idx="54">
+                  <c:v>0.63844554509412421</c:v>
+                </c:pt>
+                <c:pt idx="55">
+                  <c:v>0.64609807016277221</c:v>
+                </c:pt>
+                <c:pt idx="56">
+                  <c:v>0.64047316162648105</c:v>
+                </c:pt>
+                <c:pt idx="57">
+                  <c:v>0.64320287048032254</c:v>
+                </c:pt>
+                <c:pt idx="58">
+                  <c:v>0.63782665468863242</c:v>
+                </c:pt>
+                <c:pt idx="59">
+                  <c:v>0.6421754448810062</c:v>
+                </c:pt>
+                <c:pt idx="60">
+                  <c:v>0.61879414796514554</c:v>
+                </c:pt>
+                <c:pt idx="61">
+                  <c:v>0.64975005760288163</c:v>
+                </c:pt>
+                <c:pt idx="62">
+                  <c:v>0.64462888846984168</c:v>
+                </c:pt>
+                <c:pt idx="63">
+                  <c:v>0.26592291954606634</c:v>
+                </c:pt>
+                <c:pt idx="64">
+                  <c:v>0.62701876619770258</c:v>
+                </c:pt>
+                <c:pt idx="65">
+                  <c:v>0.58405562793840815</c:v>
+                </c:pt>
+                <c:pt idx="66">
+                  <c:v>0.60101616948166225</c:v>
+                </c:pt>
+                <c:pt idx="67">
+                  <c:v>0.54820050041995783</c:v>
+                </c:pt>
+                <c:pt idx="68">
+                  <c:v>0.50190448491945727</c:v>
+                </c:pt>
+                <c:pt idx="69">
+                  <c:v>0.50610922314747453</c:v>
+                </c:pt>
+                <c:pt idx="70">
+                  <c:v>0.52328296216307657</c:v>
+                </c:pt>
+                <c:pt idx="71">
+                  <c:v>0.52384557678681443</c:v>
+                </c:pt>
+                <c:pt idx="72">
+                  <c:v>0.33969085254788745</c:v>
+                </c:pt>
+                <c:pt idx="73">
+                  <c:v>0.59762718011496507</c:v>
+                </c:pt>
+                <c:pt idx="74">
+                  <c:v>0.6104089848220039</c:v>
+                </c:pt>
+                <c:pt idx="75">
+                  <c:v>0.60641567658942375</c:v>
+                </c:pt>
+                <c:pt idx="76">
+                  <c:v>0.54609206086896644</c:v>
+                </c:pt>
+                <c:pt idx="77">
+                  <c:v>0.58015359233688701</c:v>
+                </c:pt>
+                <c:pt idx="78">
+                  <c:v>0.60548385942403493</c:v>
+                </c:pt>
+                <c:pt idx="79">
+                  <c:v>0.55007699905477025</c:v>
+                </c:pt>
+              </c:numCache>
+            </c:numRef>
+          </c:yVal>
+          <c:smooth val="0"/>
+        </c:ser>
+        <c:dLbls>
+          <c:showLegendKey val="0"/>
+          <c:showVal val="0"/>
+          <c:showCatName val="0"/>
+          <c:showSerName val="0"/>
+          <c:showPercent val="0"/>
+          <c:showBubbleSize val="0"/>
+        </c:dLbls>
+        <c:axId val="38739968"/>
+        <c:axId val="38743040"/>
+      </c:scatterChart>
+      <c:valAx>
+        <c:axId val="38739968"/>
+        <c:scaling>
+          <c:orientation val="minMax"/>
+        </c:scaling>
+        <c:delete val="0"/>
+        <c:axPos val="b"/>
+        <c:numFmt formatCode="General" sourceLinked="1"/>
+        <c:majorTickMark val="out"/>
+        <c:minorTickMark val="none"/>
+        <c:tickLblPos val="nextTo"/>
+        <c:crossAx val="38743040"/>
+        <c:crosses val="autoZero"/>
+        <c:crossBetween val="midCat"/>
+      </c:valAx>
+      <c:valAx>
+        <c:axId val="38743040"/>
+        <c:scaling>
+          <c:orientation val="minMax"/>
+        </c:scaling>
+        <c:delete val="0"/>
+        <c:axPos val="l"/>
+        <c:majorGridlines/>
+        <c:numFmt formatCode="General" sourceLinked="1"/>
+        <c:majorTickMark val="out"/>
+        <c:minorTickMark val="none"/>
+        <c:tickLblPos val="nextTo"/>
+        <c:crossAx val="38739968"/>
+        <c:crosses val="autoZero"/>
+        <c:crossBetween val="midCat"/>
+      </c:valAx>
+    </c:plotArea>
+    <c:legend>
+      <c:legendPos val="r"/>
+      <c:layout/>
+      <c:overlay val="0"/>
+    </c:legend>
+    <c:plotVisOnly val="1"/>
+    <c:dispBlanksAs val="gap"/>
+    <c:showDLblsOverMax val="0"/>
+  </c:chart>
+  <c:externalData r:id="rId1">
+    <c:autoUpdate val="0"/>
+  </c:externalData>
+</c:chartSpace>
 </file>
 
 <file path=ppt/slideLayouts/slideLayout1.xml><?xml version="1.0" encoding="utf-8"?>
@@ -4560,18 +5742,69 @@
           <a:p>
             <a:r>
               <a:rPr lang="en-US" dirty="0" smtClean="0"/>
-              <a:t>Speedup using SHA256 and 1MB </a:t>
-            </a:r>
-            <a:r>
-              <a:rPr lang="en-US" smtClean="0"/>
-              <a:t>of input:</a:t>
-            </a:r>
-          </a:p>
-          <a:p>
-            <a:endParaRPr lang="en-US"/>
-          </a:p>
-        </p:txBody>
-      </p:sp>
+              <a:t>Speedup using SHA256 and 1MB of input</a:t>
+            </a:r>
+            <a:r>
+              <a:rPr lang="en-US" dirty="0" smtClean="0"/>
+              <a:t>:</a:t>
+            </a:r>
+          </a:p>
+          <a:p>
+            <a:endParaRPr lang="en-US" dirty="0" smtClean="0"/>
+          </a:p>
+          <a:p>
+            <a:endParaRPr lang="en-US" dirty="0"/>
+          </a:p>
+        </p:txBody>
+      </p:sp>
+      <p:graphicFrame>
+        <p:nvGraphicFramePr>
+          <p:cNvPr id="4" name="Chart 3"/>
+          <p:cNvGraphicFramePr>
+            <a:graphicFrameLocks/>
+          </p:cNvGraphicFramePr>
+          <p:nvPr>
+            <p:extLst>
+              <p:ext uri="{D42A27DB-BD31-4B8C-83A1-F6EECF244321}">
+                <p14:modId xmlns:p14="http://schemas.microsoft.com/office/powerpoint/2010/main" val="3166671399"/>
+              </p:ext>
+            </p:extLst>
+          </p:nvPr>
+        </p:nvGraphicFramePr>
+        <p:xfrm>
+          <a:off x="0" y="2057400"/>
+          <a:ext cx="7924800" cy="2133600"/>
+        </p:xfrm>
+        <a:graphic>
+          <a:graphicData uri="http://schemas.openxmlformats.org/drawingml/2006/chart">
+            <c:chart xmlns:c="http://schemas.openxmlformats.org/drawingml/2006/chart" xmlns:r="http://schemas.openxmlformats.org/officeDocument/2006/relationships" r:id="rId2"/>
+          </a:graphicData>
+        </a:graphic>
+      </p:graphicFrame>
+      <p:graphicFrame>
+        <p:nvGraphicFramePr>
+          <p:cNvPr id="5" name="Chart 4"/>
+          <p:cNvGraphicFramePr>
+            <a:graphicFrameLocks/>
+          </p:cNvGraphicFramePr>
+          <p:nvPr>
+            <p:extLst>
+              <p:ext uri="{D42A27DB-BD31-4B8C-83A1-F6EECF244321}">
+                <p14:modId xmlns:p14="http://schemas.microsoft.com/office/powerpoint/2010/main" val="2587366770"/>
+              </p:ext>
+            </p:extLst>
+          </p:nvPr>
+        </p:nvGraphicFramePr>
+        <p:xfrm>
+          <a:off x="914400" y="4267200"/>
+          <a:ext cx="7086600" cy="2286000"/>
+        </p:xfrm>
+        <a:graphic>
+          <a:graphicData uri="http://schemas.openxmlformats.org/drawingml/2006/chart">
+            <c:chart xmlns:c="http://schemas.openxmlformats.org/drawingml/2006/chart" xmlns:r="http://schemas.openxmlformats.org/officeDocument/2006/relationships" r:id="rId3"/>
+          </a:graphicData>
+        </a:graphic>
+      </p:graphicFrame>
     </p:spTree>
     <p:extLst>
       <p:ext uri="{BB962C8B-B14F-4D97-AF65-F5344CB8AC3E}">

</xml_diff>